<commit_message>
Completed lecture notes for Object Oriented part 1
This section now covers encapsulation, instance variables, getters and setters, the "this" keyword, return values, UML basics, variable scope, shadowing, constants, and reference types as they pertain to objects
</commit_message>
<xml_diff>
--- a/lectures/060_object_oriented_intro/Objects-Details.pptx
+++ b/lectures/060_object_oriented_intro/Objects-Details.pptx
@@ -3718,21 +3718,21 @@
     </dgm:pt>
   </dgm:ptLst>
   <dgm:cxnLst>
+    <dgm:cxn modelId="{046E2EC8-8818-4F04-BA82-B59AF154065B}" type="presOf" srcId="{1F31E4EB-7FF9-4D3A-88EB-9109E08BCA3E}" destId="{5039669E-FA46-47B8-8EF2-CC2BDB053DC2}" srcOrd="0" destOrd="0" presId="urn:microsoft.com/office/officeart/2005/8/layout/process1"/>
+    <dgm:cxn modelId="{7EB99A3E-B80E-45EF-9CFC-5179EAA76686}" type="presOf" srcId="{5F6AC0ED-286A-4A63-A4DC-F849F0E11962}" destId="{0DC5E6A7-AAEF-487E-9687-77EED84AFE96}" srcOrd="0" destOrd="0" presId="urn:microsoft.com/office/officeart/2005/8/layout/process1"/>
     <dgm:cxn modelId="{45C9685A-5E48-4104-A886-7F82B5CEA97C}" srcId="{85F5B3B1-5F51-4E91-865C-B78EDA7C6FEC}" destId="{A38C77CB-1C56-4912-8A18-EF94ECA2330C}" srcOrd="1" destOrd="0" parTransId="{75072E9B-F6A3-42D7-943A-F86990D11A30}" sibTransId="{BE485AFF-CF97-4EF8-A4F9-144853BF5FC0}"/>
     <dgm:cxn modelId="{33DAEB67-4450-4097-A1CF-E19CD6F049D6}" type="presOf" srcId="{85F5B3B1-5F51-4E91-865C-B78EDA7C6FEC}" destId="{CB3147C4-C333-49F6-8F64-B6E48431A674}" srcOrd="0" destOrd="0" presId="urn:microsoft.com/office/officeart/2005/8/layout/process1"/>
-    <dgm:cxn modelId="{D85CA303-1F77-43F2-A315-584834835C2C}" srcId="{85F5B3B1-5F51-4E91-865C-B78EDA7C6FEC}" destId="{38BB2282-F691-4DA3-91DB-C2811BE78DE7}" srcOrd="0" destOrd="0" parTransId="{AEC6B28C-EADD-4D11-A16E-54A24A837A9E}" sibTransId="{07581DFD-84F2-44D9-BD57-F964E21D4C48}"/>
+    <dgm:cxn modelId="{A1662C79-48FB-4672-8E16-B5D88C18A8D1}" type="presOf" srcId="{BE485AFF-CF97-4EF8-A4F9-144853BF5FC0}" destId="{4EE39A98-9F8A-41B9-A9FD-37D359FCD087}" srcOrd="1" destOrd="0" presId="urn:microsoft.com/office/officeart/2005/8/layout/process1"/>
     <dgm:cxn modelId="{1187992E-6D26-49CD-B1C6-A3741D781D42}" srcId="{85F5B3B1-5F51-4E91-865C-B78EDA7C6FEC}" destId="{DF00828A-AEBF-41DC-9FAB-2F29549D8A5B}" srcOrd="3" destOrd="0" parTransId="{8B0FFCC0-2ABD-455E-8F17-400B461870BC}" sibTransId="{970548CC-5D42-4A98-A916-139F2833D1AC}"/>
+    <dgm:cxn modelId="{D092D76C-D654-4F59-82B8-8D8B75CFC886}" type="presOf" srcId="{DF00828A-AEBF-41DC-9FAB-2F29549D8A5B}" destId="{CDABDA89-E8EC-43B7-BD89-8B8D1C29DE30}" srcOrd="0" destOrd="0" presId="urn:microsoft.com/office/officeart/2005/8/layout/process1"/>
+    <dgm:cxn modelId="{A7C43348-8AE9-4974-A5BD-C72A56DF2B68}" type="presOf" srcId="{38BB2282-F691-4DA3-91DB-C2811BE78DE7}" destId="{A2CA5990-2132-4AD5-8052-D0E11B2EF146}" srcOrd="0" destOrd="0" presId="urn:microsoft.com/office/officeart/2005/8/layout/process1"/>
     <dgm:cxn modelId="{9437D7AB-416F-4C06-9217-9632F32C1228}" srcId="{85F5B3B1-5F51-4E91-865C-B78EDA7C6FEC}" destId="{1F31E4EB-7FF9-4D3A-88EB-9109E08BCA3E}" srcOrd="2" destOrd="0" parTransId="{3031AFA0-DD41-4C49-BE48-A0BBEDEA208C}" sibTransId="{5F6AC0ED-286A-4A63-A4DC-F849F0E11962}"/>
-    <dgm:cxn modelId="{A41CF4B5-8EBA-4B6D-A18E-2DA27D6C8AA9}" type="presOf" srcId="{07581DFD-84F2-44D9-BD57-F964E21D4C48}" destId="{36F575D9-A604-45C6-97D8-B49CD63EBF0C}" srcOrd="0" destOrd="0" presId="urn:microsoft.com/office/officeart/2005/8/layout/process1"/>
     <dgm:cxn modelId="{9E4E9F31-1B40-4265-B084-F9805C656EB2}" type="presOf" srcId="{BE485AFF-CF97-4EF8-A4F9-144853BF5FC0}" destId="{5737B4F6-71C8-4AF3-822F-E7DA46723CCE}" srcOrd="0" destOrd="0" presId="urn:microsoft.com/office/officeart/2005/8/layout/process1"/>
-    <dgm:cxn modelId="{A1662C79-48FB-4672-8E16-B5D88C18A8D1}" type="presOf" srcId="{BE485AFF-CF97-4EF8-A4F9-144853BF5FC0}" destId="{4EE39A98-9F8A-41B9-A9FD-37D359FCD087}" srcOrd="1" destOrd="0" presId="urn:microsoft.com/office/officeart/2005/8/layout/process1"/>
-    <dgm:cxn modelId="{046E2EC8-8818-4F04-BA82-B59AF154065B}" type="presOf" srcId="{1F31E4EB-7FF9-4D3A-88EB-9109E08BCA3E}" destId="{5039669E-FA46-47B8-8EF2-CC2BDB053DC2}" srcOrd="0" destOrd="0" presId="urn:microsoft.com/office/officeart/2005/8/layout/process1"/>
     <dgm:cxn modelId="{96751092-F3F3-4E00-A43B-F0B6E3DA1B44}" type="presOf" srcId="{07581DFD-84F2-44D9-BD57-F964E21D4C48}" destId="{DEFF9E5C-4A1F-47F7-947F-4F8804144F57}" srcOrd="1" destOrd="0" presId="urn:microsoft.com/office/officeart/2005/8/layout/process1"/>
     <dgm:cxn modelId="{FF4DC359-8663-4A58-8C70-3269BB8E5EF9}" type="presOf" srcId="{A38C77CB-1C56-4912-8A18-EF94ECA2330C}" destId="{B8DF85DC-D055-46CB-AC04-9D043AB46307}" srcOrd="0" destOrd="0" presId="urn:microsoft.com/office/officeart/2005/8/layout/process1"/>
     <dgm:cxn modelId="{BF555F22-B524-4FC1-9BB1-5C9CF948D1F2}" type="presOf" srcId="{5F6AC0ED-286A-4A63-A4DC-F849F0E11962}" destId="{B73F373F-22DE-456D-990C-117DC9008B9E}" srcOrd="1" destOrd="0" presId="urn:microsoft.com/office/officeart/2005/8/layout/process1"/>
-    <dgm:cxn modelId="{A7C43348-8AE9-4974-A5BD-C72A56DF2B68}" type="presOf" srcId="{38BB2282-F691-4DA3-91DB-C2811BE78DE7}" destId="{A2CA5990-2132-4AD5-8052-D0E11B2EF146}" srcOrd="0" destOrd="0" presId="urn:microsoft.com/office/officeart/2005/8/layout/process1"/>
-    <dgm:cxn modelId="{7EB99A3E-B80E-45EF-9CFC-5179EAA76686}" type="presOf" srcId="{5F6AC0ED-286A-4A63-A4DC-F849F0E11962}" destId="{0DC5E6A7-AAEF-487E-9687-77EED84AFE96}" srcOrd="0" destOrd="0" presId="urn:microsoft.com/office/officeart/2005/8/layout/process1"/>
-    <dgm:cxn modelId="{D092D76C-D654-4F59-82B8-8D8B75CFC886}" type="presOf" srcId="{DF00828A-AEBF-41DC-9FAB-2F29549D8A5B}" destId="{CDABDA89-E8EC-43B7-BD89-8B8D1C29DE30}" srcOrd="0" destOrd="0" presId="urn:microsoft.com/office/officeart/2005/8/layout/process1"/>
+    <dgm:cxn modelId="{D85CA303-1F77-43F2-A315-584834835C2C}" srcId="{85F5B3B1-5F51-4E91-865C-B78EDA7C6FEC}" destId="{38BB2282-F691-4DA3-91DB-C2811BE78DE7}" srcOrd="0" destOrd="0" parTransId="{AEC6B28C-EADD-4D11-A16E-54A24A837A9E}" sibTransId="{07581DFD-84F2-44D9-BD57-F964E21D4C48}"/>
+    <dgm:cxn modelId="{A41CF4B5-8EBA-4B6D-A18E-2DA27D6C8AA9}" type="presOf" srcId="{07581DFD-84F2-44D9-BD57-F964E21D4C48}" destId="{36F575D9-A604-45C6-97D8-B49CD63EBF0C}" srcOrd="0" destOrd="0" presId="urn:microsoft.com/office/officeart/2005/8/layout/process1"/>
     <dgm:cxn modelId="{5DD6E5C6-BB76-442C-9D2F-EAE7E8BA1D01}" type="presParOf" srcId="{CB3147C4-C333-49F6-8F64-B6E48431A674}" destId="{A2CA5990-2132-4AD5-8052-D0E11B2EF146}" srcOrd="0" destOrd="0" presId="urn:microsoft.com/office/officeart/2005/8/layout/process1"/>
     <dgm:cxn modelId="{DD477418-EDB3-48A8-9568-04C9110248D7}" type="presParOf" srcId="{CB3147C4-C333-49F6-8F64-B6E48431A674}" destId="{36F575D9-A604-45C6-97D8-B49CD63EBF0C}" srcOrd="1" destOrd="0" presId="urn:microsoft.com/office/officeart/2005/8/layout/process1"/>
     <dgm:cxn modelId="{A6E35045-9019-4094-91DF-EDFFD8E33FFD}" type="presParOf" srcId="{36F575D9-A604-45C6-97D8-B49CD63EBF0C}" destId="{DEFF9E5C-4A1F-47F7-947F-4F8804144F57}" srcOrd="0" destOrd="0" presId="urn:microsoft.com/office/officeart/2005/8/layout/process1"/>
@@ -5547,7 +5547,7 @@
           <a:p>
             <a:fld id="{2507D560-C4D4-4804-8CBF-2C56AB6C6DB9}" type="datetimeFigureOut">
               <a:rPr lang="en-US" smtClean="0"/>
-              <a:t>5/26/2021</a:t>
+              <a:t>5/27/2021</a:t>
             </a:fld>
             <a:endParaRPr lang="en-US"/>
           </a:p>
@@ -5712,7 +5712,7 @@
           <a:p>
             <a:fld id="{688E7586-9A7B-41FF-B169-85DADA744493}" type="datetimeFigureOut">
               <a:rPr lang="en-US" smtClean="0"/>
-              <a:t>5/26/2021</a:t>
+              <a:t>5/27/2021</a:t>
             </a:fld>
             <a:endParaRPr lang="en-US"/>
           </a:p>
@@ -21868,8 +21868,8 @@
         </p:nvSpPr>
         <p:spPr>
           <a:xfrm>
-            <a:off x="6452026" y="3733800"/>
-            <a:ext cx="5486400" cy="1981953"/>
+            <a:off x="6170612" y="3276600"/>
+            <a:ext cx="5791200" cy="2770117"/>
           </a:xfrm>
           <a:prstGeom prst="rect">
             <a:avLst/>
@@ -21969,8 +21969,93 @@
           <a:p>
             <a:r>
               <a:rPr lang="en-US" dirty="0"/>
-              <a:t>  int</a:t>
-            </a:r>
+              <a:t>  </a:t>
+            </a:r>
+            <a:r>
+              <a:rPr lang="en-US" dirty="0" smtClean="0"/>
+              <a:t>decimal</a:t>
+            </a:r>
+            <a:r>
+              <a:rPr lang="en-US" dirty="0"/>
+              <a:t> </a:t>
+            </a:r>
+            <a:r>
+              <a:rPr lang="en-US" dirty="0" err="1">
+                <a:solidFill>
+                  <a:schemeClr val="tx1"/>
+                </a:solidFill>
+              </a:rPr>
+              <a:t>yearlyPrice</a:t>
+            </a:r>
+            <a:r>
+              <a:rPr lang="en-US" dirty="0">
+                <a:solidFill>
+                  <a:schemeClr val="tx1"/>
+                </a:solidFill>
+              </a:rPr>
+              <a:t> = </a:t>
+            </a:r>
+            <a:r>
+              <a:rPr lang="en-US" dirty="0">
+                <a:solidFill>
+                  <a:srgbClr val="99CC00"/>
+                </a:solidFill>
+              </a:rPr>
+              <a:t>2000.0m</a:t>
+            </a:r>
+            <a:r>
+              <a:rPr lang="en-US" dirty="0">
+                <a:solidFill>
+                  <a:schemeClr val="tx1"/>
+                </a:solidFill>
+              </a:rPr>
+              <a:t>;</a:t>
+            </a:r>
+          </a:p>
+          <a:p>
+            <a:r>
+              <a:rPr lang="en-US" dirty="0"/>
+              <a:t>  </a:t>
+            </a:r>
+            <a:r>
+              <a:rPr lang="en-US" dirty="0" smtClean="0"/>
+              <a:t>decimal</a:t>
+            </a:r>
+            <a:r>
+              <a:rPr lang="en-US" dirty="0"/>
+              <a:t> </a:t>
+            </a:r>
+            <a:r>
+              <a:rPr lang="en-US" dirty="0" err="1">
+                <a:solidFill>
+                  <a:schemeClr val="tx1"/>
+                </a:solidFill>
+              </a:rPr>
+              <a:t>monthlyPrice</a:t>
+            </a:r>
+            <a:r>
+              <a:rPr lang="en-US" dirty="0">
+                <a:solidFill>
+                  <a:schemeClr val="tx1"/>
+                </a:solidFill>
+              </a:rPr>
+              <a:t> = </a:t>
+            </a:r>
+            <a:r>
+              <a:rPr lang="en-US" dirty="0" err="1" smtClean="0">
+                <a:solidFill>
+                  <a:schemeClr val="tx1"/>
+                </a:solidFill>
+              </a:rPr>
+              <a:t>yearlyPrice</a:t>
+            </a:r>
+            <a:endParaRPr lang="en-US" dirty="0" smtClean="0">
+              <a:solidFill>
+                <a:schemeClr val="tx1"/>
+              </a:solidFill>
+            </a:endParaRPr>
+          </a:p>
+          <a:p>
             <a:r>
               <a:rPr lang="en-US" dirty="0">
                 <a:solidFill>
@@ -21980,23 +22065,23 @@
               <a:t> </a:t>
             </a:r>
             <a:r>
-              <a:rPr lang="en-US" dirty="0" err="1">
-                <a:solidFill>
-                  <a:schemeClr val="tx1"/>
-                </a:solidFill>
-              </a:rPr>
-              <a:t>numMonths</a:t>
-            </a:r>
-            <a:r>
-              <a:rPr lang="en-US" dirty="0">
-                <a:solidFill>
-                  <a:schemeClr val="tx1"/>
-                </a:solidFill>
-              </a:rPr>
-              <a:t> = </a:t>
-            </a:r>
-            <a:r>
-              <a:rPr lang="en-US" dirty="0" err="1">
+              <a:rPr lang="en-US" dirty="0" smtClean="0">
+                <a:solidFill>
+                  <a:schemeClr val="tx1"/>
+                </a:solidFill>
+              </a:rPr>
+              <a:t>  </a:t>
+            </a:r>
+            <a:r>
+              <a:rPr lang="en-US" dirty="0">
+                <a:solidFill>
+                  <a:schemeClr val="tx1"/>
+                </a:solidFill>
+              </a:rPr>
+              <a:t> / </a:t>
+            </a:r>
+            <a:r>
+              <a:rPr lang="en-US" dirty="0" err="1" smtClean="0">
                 <a:solidFill>
                   <a:srgbClr val="66FFCC"/>
                 </a:solidFill>
@@ -22004,7 +22089,7 @@
               <a:t>Calendar</a:t>
             </a:r>
             <a:r>
-              <a:rPr lang="en-US" dirty="0" err="1">
+              <a:rPr lang="en-US" dirty="0" err="1" smtClean="0">
                 <a:solidFill>
                   <a:schemeClr val="tx1"/>
                 </a:solidFill>
@@ -22012,13 +22097,18 @@
               <a:t>.MONTHS</a:t>
             </a:r>
             <a:r>
-              <a:rPr lang="en-US" dirty="0">
+              <a:rPr lang="en-US" dirty="0" smtClean="0">
                 <a:solidFill>
                   <a:schemeClr val="tx1"/>
                 </a:solidFill>
               </a:rPr>
               <a:t>;</a:t>
             </a:r>
+            <a:endParaRPr lang="en-US" dirty="0">
+              <a:solidFill>
+                <a:schemeClr val="tx1"/>
+              </a:solidFill>
+            </a:endParaRPr>
           </a:p>
           <a:p>
             <a:pPr>
@@ -22027,7 +22117,7 @@
               </a:lnSpc>
             </a:pPr>
             <a:r>
-              <a:rPr lang="en-US" dirty="0"/>
+              <a:rPr lang="en-US" dirty="0" smtClean="0"/>
               <a:t>  </a:t>
             </a:r>
             <a:r>
@@ -25690,15 +25780,39 @@
                   <a:srgbClr val="FF5050"/>
                 </a:solidFill>
               </a:rPr>
-              <a:t>    + "by </a:t>
-            </a:r>
-            <a:r>
-              <a:rPr lang="en-US" dirty="0">
+              <a:t>    + </a:t>
+            </a:r>
+            <a:r>
+              <a:rPr lang="en-US" dirty="0" smtClean="0">
+                <a:solidFill>
+                  <a:srgbClr val="FF5050"/>
+                </a:solidFill>
+              </a:rPr>
+              <a:t>$"</a:t>
+            </a:r>
+            <a:r>
+              <a:rPr lang="en-US" dirty="0">
+                <a:solidFill>
+                  <a:srgbClr val="FF5050"/>
+                </a:solidFill>
+              </a:rPr>
+              <a:t>by </a:t>
+            </a:r>
+            <a:r>
+              <a:rPr lang="en-US" dirty="0" smtClean="0">
                 <a:solidFill>
                   <a:srgbClr val="99CCFF"/>
                 </a:solidFill>
               </a:rPr>
-              <a:t>{rect1.GetWidth()}</a:t>
+              <a:t>{</a:t>
+            </a:r>
+            <a:r>
+              <a:rPr lang="en-US" dirty="0">
+                <a:solidFill>
+                  <a:srgbClr val="99CCFF"/>
+                </a:solidFill>
+              </a:rPr>
+              <a:t>rect1.GetWidth()}</a:t>
             </a:r>
             <a:r>
               <a:rPr lang="en-US" dirty="0">
@@ -25790,7 +25904,23 @@
                   <a:srgbClr val="FF5050"/>
                 </a:solidFill>
               </a:rPr>
-              <a:t>    + "by </a:t>
+              <a:t>    + </a:t>
+            </a:r>
+            <a:r>
+              <a:rPr lang="en-US" dirty="0" smtClean="0">
+                <a:solidFill>
+                  <a:srgbClr val="FF5050"/>
+                </a:solidFill>
+              </a:rPr>
+              <a:t>$"</a:t>
+            </a:r>
+            <a:r>
+              <a:rPr lang="en-US" dirty="0">
+                <a:solidFill>
+                  <a:srgbClr val="FF5050"/>
+                </a:solidFill>
+              </a:rPr>
+              <a:t>by </a:t>
             </a:r>
             <a:r>
               <a:rPr lang="en-US" dirty="0">

</xml_diff>